<commit_message>
Updated Powerpoint for Demo
</commit_message>
<xml_diff>
--- a/Documentation/Presentations/STORM Demo1.pptx
+++ b/Documentation/Presentations/STORM Demo1.pptx
@@ -9,7 +9,11 @@
     <p:sldId id="257" r:id="rId3"/>
     <p:sldId id="258" r:id="rId4"/>
     <p:sldId id="259" r:id="rId5"/>
-    <p:sldId id="260" r:id="rId6"/>
+    <p:sldId id="261" r:id="rId6"/>
+    <p:sldId id="262" r:id="rId7"/>
+    <p:sldId id="263" r:id="rId8"/>
+    <p:sldId id="264" r:id="rId9"/>
+    <p:sldId id="260" r:id="rId10"/>
   </p:sldIdLst>
   <p:sldSz cx="9144000" cy="6858000" type="screen4x3"/>
   <p:notesSz cx="6858000" cy="9144000"/>
@@ -4777,7 +4781,7 @@
           <a:p>
             <a:fld id="{C36E044D-5B51-8C48-861D-30F8C9FE6464}" type="datetimeFigureOut">
               <a:rPr lang="en-US" smtClean="0"/>
-              <a:t>15/05/28</a:t>
+              <a:t>15/05/29</a:t>
             </a:fld>
             <a:endParaRPr lang="en-US"/>
           </a:p>
@@ -5151,7 +5155,7 @@
           <a:p>
             <a:fld id="{C36E044D-5B51-8C48-861D-30F8C9FE6464}" type="datetimeFigureOut">
               <a:rPr lang="en-US" smtClean="0"/>
-              <a:t>15/05/28</a:t>
+              <a:t>15/05/29</a:t>
             </a:fld>
             <a:endParaRPr lang="en-US"/>
           </a:p>
@@ -5528,7 +5532,7 @@
           <a:p>
             <a:fld id="{C36E044D-5B51-8C48-861D-30F8C9FE6464}" type="datetimeFigureOut">
               <a:rPr lang="en-US" smtClean="0"/>
-              <a:t>15/05/28</a:t>
+              <a:t>15/05/29</a:t>
             </a:fld>
             <a:endParaRPr lang="en-US"/>
           </a:p>
@@ -6037,7 +6041,7 @@
           <a:p>
             <a:fld id="{C36E044D-5B51-8C48-861D-30F8C9FE6464}" type="datetimeFigureOut">
               <a:rPr lang="en-US" smtClean="0"/>
-              <a:t>15/05/28</a:t>
+              <a:t>15/05/29</a:t>
             </a:fld>
             <a:endParaRPr lang="en-US"/>
           </a:p>
@@ -6278,7 +6282,7 @@
           <a:p>
             <a:fld id="{C36E044D-5B51-8C48-861D-30F8C9FE6464}" type="datetimeFigureOut">
               <a:rPr lang="en-US" smtClean="0"/>
-              <a:t>15/05/28</a:t>
+              <a:t>15/05/29</a:t>
             </a:fld>
             <a:endParaRPr lang="en-US"/>
           </a:p>
@@ -6509,7 +6513,7 @@
           <a:p>
             <a:fld id="{C36E044D-5B51-8C48-861D-30F8C9FE6464}" type="datetimeFigureOut">
               <a:rPr lang="en-US" smtClean="0"/>
-              <a:t>15/05/28</a:t>
+              <a:t>15/05/29</a:t>
             </a:fld>
             <a:endParaRPr lang="en-US"/>
           </a:p>
@@ -13865,7 +13869,7 @@
           <a:p>
             <a:fld id="{C36E044D-5B51-8C48-861D-30F8C9FE6464}" type="datetimeFigureOut">
               <a:rPr lang="en-US" smtClean="0"/>
-              <a:t>15/05/28</a:t>
+              <a:t>15/05/29</a:t>
             </a:fld>
             <a:endParaRPr lang="en-US"/>
           </a:p>
@@ -14402,7 +14406,7 @@
           <a:p>
             <a:fld id="{C36E044D-5B51-8C48-861D-30F8C9FE6464}" type="datetimeFigureOut">
               <a:rPr lang="en-US" smtClean="0"/>
-              <a:t>15/05/28</a:t>
+              <a:t>15/05/29</a:t>
             </a:fld>
             <a:endParaRPr lang="en-US"/>
           </a:p>
@@ -14577,7 +14581,7 @@
           <a:p>
             <a:fld id="{C36E044D-5B51-8C48-861D-30F8C9FE6464}" type="datetimeFigureOut">
               <a:rPr lang="en-US" smtClean="0"/>
-              <a:t>15/05/28</a:t>
+              <a:t>15/05/29</a:t>
             </a:fld>
             <a:endParaRPr lang="en-US"/>
           </a:p>
@@ -14667,7 +14671,7 @@
           <a:p>
             <a:fld id="{C36E044D-5B51-8C48-861D-30F8C9FE6464}" type="datetimeFigureOut">
               <a:rPr lang="en-US" smtClean="0"/>
-              <a:t>15/05/28</a:t>
+              <a:t>15/05/29</a:t>
             </a:fld>
             <a:endParaRPr lang="en-US"/>
           </a:p>
@@ -15003,7 +15007,7 @@
           <a:p>
             <a:fld id="{C36E044D-5B51-8C48-861D-30F8C9FE6464}" type="datetimeFigureOut">
               <a:rPr lang="en-US" smtClean="0"/>
-              <a:t>15/05/28</a:t>
+              <a:t>15/05/29</a:t>
             </a:fld>
             <a:endParaRPr lang="en-US"/>
           </a:p>
@@ -16423,7 +16427,7 @@
           <a:p>
             <a:fld id="{C36E044D-5B51-8C48-861D-30F8C9FE6464}" type="datetimeFigureOut">
               <a:rPr lang="en-US" smtClean="0"/>
-              <a:t>15/05/28</a:t>
+              <a:t>15/05/29</a:t>
             </a:fld>
             <a:endParaRPr lang="en-US"/>
           </a:p>
@@ -17357,7 +17361,6 @@
               <a:rPr lang="en-US" dirty="0"/>
               <a:t>Random shuffle of teams</a:t>
             </a:r>
-            <a:endParaRPr lang="en-US" dirty="0"/>
           </a:p>
         </p:txBody>
       </p:sp>
@@ -17415,9 +17418,204 @@
           <a:p>
             <a:r>
               <a:rPr lang="en-US" dirty="0" smtClean="0"/>
-              <a:t>And now the fun part</a:t>
+              <a:t>Challenges</a:t>
             </a:r>
             <a:endParaRPr lang="en-US" dirty="0"/>
+          </a:p>
+        </p:txBody>
+      </p:sp>
+      <p:sp>
+        <p:nvSpPr>
+          <p:cNvPr id="3" name="Content Placeholder 2"/>
+          <p:cNvSpPr>
+            <a:spLocks noGrp="1"/>
+          </p:cNvSpPr>
+          <p:nvPr>
+            <p:ph idx="1"/>
+          </p:nvPr>
+        </p:nvSpPr>
+        <p:spPr/>
+        <p:txBody>
+          <a:bodyPr>
+            <a:normAutofit lnSpcReduction="10000"/>
+          </a:bodyPr>
+          <a:lstStyle/>
+          <a:p>
+            <a:r>
+              <a:rPr lang="en-US" dirty="0" smtClean="0"/>
+              <a:t>The challenges we faced so far may have been remedial, but it still has an effect on on a project like this.</a:t>
+            </a:r>
+          </a:p>
+          <a:p>
+            <a:pPr>
+              <a:buFont typeface="Arial"/>
+              <a:buChar char="•"/>
+            </a:pPr>
+            <a:r>
+              <a:rPr lang="en-US" b="1" dirty="0" smtClean="0"/>
+              <a:t>The untrustworthy university Wi-Fi.</a:t>
+            </a:r>
+          </a:p>
+          <a:p>
+            <a:pPr>
+              <a:buFont typeface="Arial"/>
+              <a:buChar char="•"/>
+            </a:pPr>
+            <a:r>
+              <a:rPr lang="en-US" dirty="0" smtClean="0"/>
+              <a:t>Deciding in which technologies to make use of.</a:t>
+            </a:r>
+          </a:p>
+          <a:p>
+            <a:pPr>
+              <a:buFont typeface="Arial"/>
+              <a:buChar char="•"/>
+            </a:pPr>
+            <a:r>
+              <a:rPr lang="en-US" dirty="0" smtClean="0"/>
+              <a:t>Finding a way to host our </a:t>
+            </a:r>
+            <a:r>
+              <a:rPr lang="en-US" dirty="0" err="1" smtClean="0"/>
+              <a:t>MongoDB</a:t>
+            </a:r>
+            <a:r>
+              <a:rPr lang="en-US" dirty="0" smtClean="0"/>
+              <a:t>, as we can only get a 60 day free trail for hosting.</a:t>
+            </a:r>
+          </a:p>
+        </p:txBody>
+      </p:sp>
+    </p:spTree>
+    <p:extLst>
+      <p:ext uri="{BB962C8B-B14F-4D97-AF65-F5344CB8AC3E}">
+        <p14:creationId xmlns:p14="http://schemas.microsoft.com/office/powerpoint/2010/main" val="1506105925"/>
+      </p:ext>
+    </p:extLst>
+  </p:cSld>
+  <p:clrMapOvr>
+    <a:masterClrMapping/>
+  </p:clrMapOvr>
+</p:sld>
+</file>
+
+<file path=ppt/slides/slide6.xml><?xml version="1.0" encoding="utf-8"?>
+<p:sld xmlns:a="http://schemas.openxmlformats.org/drawingml/2006/main" xmlns:r="http://schemas.openxmlformats.org/officeDocument/2006/relationships" xmlns:p="http://schemas.openxmlformats.org/presentationml/2006/main">
+  <p:cSld>
+    <p:spTree>
+      <p:nvGrpSpPr>
+        <p:cNvPr id="1" name=""/>
+        <p:cNvGrpSpPr/>
+        <p:nvPr/>
+      </p:nvGrpSpPr>
+      <p:grpSpPr>
+        <a:xfrm>
+          <a:off x="0" y="0"/>
+          <a:ext cx="0" cy="0"/>
+          <a:chOff x="0" y="0"/>
+          <a:chExt cx="0" cy="0"/>
+        </a:xfrm>
+      </p:grpSpPr>
+      <p:sp>
+        <p:nvSpPr>
+          <p:cNvPr id="2" name="Title 1"/>
+          <p:cNvSpPr>
+            <a:spLocks noGrp="1"/>
+          </p:cNvSpPr>
+          <p:nvPr>
+            <p:ph type="title"/>
+          </p:nvPr>
+        </p:nvSpPr>
+        <p:spPr/>
+        <p:txBody>
+          <a:bodyPr/>
+          <a:lstStyle/>
+          <a:p>
+            <a:r>
+              <a:rPr lang="en-US" dirty="0" smtClean="0"/>
+              <a:t>How we handled the challenges</a:t>
+            </a:r>
+            <a:endParaRPr lang="en-US" dirty="0"/>
+          </a:p>
+        </p:txBody>
+      </p:sp>
+      <p:sp>
+        <p:nvSpPr>
+          <p:cNvPr id="3" name="Content Placeholder 2"/>
+          <p:cNvSpPr>
+            <a:spLocks noGrp="1"/>
+          </p:cNvSpPr>
+          <p:nvPr>
+            <p:ph idx="1"/>
+          </p:nvPr>
+        </p:nvSpPr>
+        <p:spPr/>
+        <p:txBody>
+          <a:bodyPr>
+            <a:normAutofit/>
+          </a:bodyPr>
+          <a:lstStyle/>
+          <a:p>
+            <a:pPr>
+              <a:buFont typeface="Arial"/>
+              <a:buChar char="•"/>
+            </a:pPr>
+            <a:r>
+              <a:rPr lang="en-US" dirty="0" smtClean="0"/>
+              <a:t>We still do not have a solution to the Wi-Fi problem, at this moment we just accepted the issue and bring our own mobile routers with to the group programming sessions.</a:t>
+            </a:r>
+          </a:p>
+        </p:txBody>
+      </p:sp>
+    </p:spTree>
+    <p:extLst>
+      <p:ext uri="{BB962C8B-B14F-4D97-AF65-F5344CB8AC3E}">
+        <p14:creationId xmlns:p14="http://schemas.microsoft.com/office/powerpoint/2010/main" val="3901536570"/>
+      </p:ext>
+    </p:extLst>
+  </p:cSld>
+  <p:clrMapOvr>
+    <a:masterClrMapping/>
+  </p:clrMapOvr>
+</p:sld>
+</file>
+
+<file path=ppt/slides/slide7.xml><?xml version="1.0" encoding="utf-8"?>
+<p:sld xmlns:a="http://schemas.openxmlformats.org/drawingml/2006/main" xmlns:r="http://schemas.openxmlformats.org/officeDocument/2006/relationships" xmlns:p="http://schemas.openxmlformats.org/presentationml/2006/main">
+  <p:cSld>
+    <p:spTree>
+      <p:nvGrpSpPr>
+        <p:cNvPr id="1" name=""/>
+        <p:cNvGrpSpPr/>
+        <p:nvPr/>
+      </p:nvGrpSpPr>
+      <p:grpSpPr>
+        <a:xfrm>
+          <a:off x="0" y="0"/>
+          <a:ext cx="0" cy="0"/>
+          <a:chOff x="0" y="0"/>
+          <a:chExt cx="0" cy="0"/>
+        </a:xfrm>
+      </p:grpSpPr>
+      <p:sp>
+        <p:nvSpPr>
+          <p:cNvPr id="2" name="Title 1"/>
+          <p:cNvSpPr>
+            <a:spLocks noGrp="1"/>
+          </p:cNvSpPr>
+          <p:nvPr>
+            <p:ph type="title"/>
+          </p:nvPr>
+        </p:nvSpPr>
+        <p:spPr/>
+        <p:txBody>
+          <a:bodyPr/>
+          <a:lstStyle/>
+          <a:p>
+            <a:r>
+              <a:rPr lang="en-US" dirty="0"/>
+              <a:t>How we handled the challenges</a:t>
+            </a:r>
           </a:p>
         </p:txBody>
       </p:sp>
@@ -17436,28 +17634,296 @@
           <a:bodyPr/>
           <a:lstStyle/>
           <a:p>
+            <a:pPr>
+              <a:buFont typeface="Arial"/>
+              <a:buChar char="•"/>
+            </a:pPr>
+            <a:r>
+              <a:rPr lang="en-US" dirty="0"/>
+              <a:t>Concerning the technologies, the client wants a web-based system. So far we have used HTML and PHP for the front-end development, but we are looking into JavaScript (Mainly </a:t>
+            </a:r>
+            <a:r>
+              <a:rPr lang="en-US" dirty="0" err="1"/>
+              <a:t>node.js</a:t>
+            </a:r>
+            <a:r>
+              <a:rPr lang="en-US" dirty="0"/>
+              <a:t>) for the back-end development, as this makes the whole package and release system easier.</a:t>
+            </a:r>
+          </a:p>
+        </p:txBody>
+      </p:sp>
+    </p:spTree>
+    <p:extLst>
+      <p:ext uri="{BB962C8B-B14F-4D97-AF65-F5344CB8AC3E}">
+        <p14:creationId xmlns:p14="http://schemas.microsoft.com/office/powerpoint/2010/main" val="4050145349"/>
+      </p:ext>
+    </p:extLst>
+  </p:cSld>
+  <p:clrMapOvr>
+    <a:masterClrMapping/>
+  </p:clrMapOvr>
+</p:sld>
+</file>
+
+<file path=ppt/slides/slide8.xml><?xml version="1.0" encoding="utf-8"?>
+<p:sld xmlns:a="http://schemas.openxmlformats.org/drawingml/2006/main" xmlns:r="http://schemas.openxmlformats.org/officeDocument/2006/relationships" xmlns:p="http://schemas.openxmlformats.org/presentationml/2006/main">
+  <p:cSld>
+    <p:spTree>
+      <p:nvGrpSpPr>
+        <p:cNvPr id="1" name=""/>
+        <p:cNvGrpSpPr/>
+        <p:nvPr/>
+      </p:nvGrpSpPr>
+      <p:grpSpPr>
+        <a:xfrm>
+          <a:off x="0" y="0"/>
+          <a:ext cx="0" cy="0"/>
+          <a:chOff x="0" y="0"/>
+          <a:chExt cx="0" cy="0"/>
+        </a:xfrm>
+      </p:grpSpPr>
+      <p:sp>
+        <p:nvSpPr>
+          <p:cNvPr id="2" name="Title 1"/>
+          <p:cNvSpPr>
+            <a:spLocks noGrp="1"/>
+          </p:cNvSpPr>
+          <p:nvPr>
+            <p:ph type="title"/>
+          </p:nvPr>
+        </p:nvSpPr>
+        <p:spPr/>
+        <p:txBody>
+          <a:bodyPr/>
+          <a:lstStyle/>
+          <a:p>
+            <a:r>
+              <a:rPr lang="en-US" dirty="0"/>
+              <a:t>How we handled the challenges</a:t>
+            </a:r>
+          </a:p>
+        </p:txBody>
+      </p:sp>
+      <p:sp>
+        <p:nvSpPr>
+          <p:cNvPr id="3" name="Content Placeholder 2"/>
+          <p:cNvSpPr>
+            <a:spLocks noGrp="1"/>
+          </p:cNvSpPr>
+          <p:nvPr>
+            <p:ph idx="1"/>
+          </p:nvPr>
+        </p:nvSpPr>
+        <p:spPr/>
+        <p:txBody>
+          <a:bodyPr>
+            <a:normAutofit fontScale="85000" lnSpcReduction="10000"/>
+          </a:bodyPr>
+          <a:lstStyle/>
+          <a:p>
+            <a:pPr>
+              <a:buFont typeface="Arial"/>
+              <a:buChar char="•"/>
+            </a:pPr>
+            <a:r>
+              <a:rPr lang="en-US" dirty="0"/>
+              <a:t>Concerning the </a:t>
+            </a:r>
+            <a:r>
+              <a:rPr lang="en-US" dirty="0" err="1" smtClean="0"/>
+              <a:t>MongoDB</a:t>
+            </a:r>
             <a:r>
               <a:rPr lang="en-US" dirty="0" smtClean="0"/>
-              <a:t>Click here to open our program.</a:t>
+              <a:t>, we have emailed the hosting companies asking for a solution to this problem, as we are students and this is used for study purposes.</a:t>
             </a:r>
           </a:p>
           <a:p>
+            <a:pPr>
+              <a:buFont typeface="Arial"/>
+              <a:buChar char="•"/>
+            </a:pPr>
+            <a:r>
+              <a:rPr lang="en-US" dirty="0" smtClean="0"/>
+              <a:t>We got a reply from someone at the </a:t>
+            </a:r>
+            <a:r>
+              <a:rPr lang="en-US" dirty="0"/>
+              <a:t>Google Cloud Platform Sales </a:t>
+            </a:r>
+            <a:r>
+              <a:rPr lang="en-US" dirty="0" smtClean="0"/>
+              <a:t>Team, which gave us some information on solutions to explore through their cloud servers.</a:t>
+            </a:r>
+          </a:p>
+          <a:p>
+            <a:pPr>
+              <a:buFont typeface="Arial"/>
+              <a:buChar char="•"/>
+            </a:pPr>
+            <a:r>
+              <a:rPr lang="en-US" dirty="0" smtClean="0"/>
+              <a:t>But for now, we have decided to start with the 60 day </a:t>
+            </a:r>
+            <a:r>
+              <a:rPr lang="en-US" smtClean="0"/>
+              <a:t>trial until </a:t>
+            </a:r>
+            <a:r>
+              <a:rPr lang="en-US" dirty="0" smtClean="0"/>
+              <a:t>we get a more concrete solution for the hosting.</a:t>
+            </a:r>
             <a:endParaRPr lang="en-US" dirty="0"/>
+          </a:p>
+        </p:txBody>
+      </p:sp>
+    </p:spTree>
+    <p:extLst>
+      <p:ext uri="{BB962C8B-B14F-4D97-AF65-F5344CB8AC3E}">
+        <p14:creationId xmlns:p14="http://schemas.microsoft.com/office/powerpoint/2010/main" val="1782444689"/>
+      </p:ext>
+    </p:extLst>
+  </p:cSld>
+  <p:clrMapOvr>
+    <a:masterClrMapping/>
+  </p:clrMapOvr>
+</p:sld>
+</file>
+
+<file path=ppt/slides/slide9.xml><?xml version="1.0" encoding="utf-8"?>
+<p:sld xmlns:a="http://schemas.openxmlformats.org/drawingml/2006/main" xmlns:r="http://schemas.openxmlformats.org/officeDocument/2006/relationships" xmlns:p="http://schemas.openxmlformats.org/presentationml/2006/main">
+  <p:cSld>
+    <p:spTree>
+      <p:nvGrpSpPr>
+        <p:cNvPr id="1" name=""/>
+        <p:cNvGrpSpPr/>
+        <p:nvPr/>
+      </p:nvGrpSpPr>
+      <p:grpSpPr>
+        <a:xfrm>
+          <a:off x="0" y="0"/>
+          <a:ext cx="0" cy="0"/>
+          <a:chOff x="0" y="0"/>
+          <a:chExt cx="0" cy="0"/>
+        </a:xfrm>
+      </p:grpSpPr>
+      <p:sp>
+        <p:nvSpPr>
+          <p:cNvPr id="2" name="Title 1"/>
+          <p:cNvSpPr>
+            <a:spLocks noGrp="1"/>
+          </p:cNvSpPr>
+          <p:nvPr>
+            <p:ph type="title"/>
+          </p:nvPr>
+        </p:nvSpPr>
+        <p:spPr/>
+        <p:txBody>
+          <a:bodyPr/>
+          <a:lstStyle/>
+          <a:p>
+            <a:r>
+              <a:rPr lang="en-US" dirty="0" smtClean="0"/>
+              <a:t>And now the fun part</a:t>
+            </a:r>
+            <a:endParaRPr lang="en-US" dirty="0"/>
+          </a:p>
+        </p:txBody>
+      </p:sp>
+      <p:sp>
+        <p:nvSpPr>
+          <p:cNvPr id="3" name="Content Placeholder 2"/>
+          <p:cNvSpPr>
+            <a:spLocks noGrp="1"/>
+          </p:cNvSpPr>
+          <p:nvPr>
+            <p:ph idx="1"/>
+          </p:nvPr>
+        </p:nvSpPr>
+        <p:spPr>
+          <a:xfrm>
+            <a:off x="523875" y="3012142"/>
+            <a:ext cx="8207375" cy="3388658"/>
+          </a:xfrm>
+        </p:spPr>
+        <p:txBody>
+          <a:bodyPr/>
+          <a:lstStyle/>
+          <a:p>
+            <a:r>
+              <a:rPr lang="en-US" dirty="0" smtClean="0"/>
+              <a:t>Click here to </a:t>
+            </a:r>
+            <a:r>
+              <a:rPr lang="en-US" dirty="0" smtClean="0"/>
+              <a:t>navigate to the appropriate directory</a:t>
+            </a:r>
+            <a:r>
+              <a:rPr lang="en-US" dirty="0" smtClean="0"/>
+              <a:t>.</a:t>
+            </a:r>
+            <a:endParaRPr lang="en-US" dirty="0" smtClean="0"/>
+          </a:p>
+          <a:p>
+            <a:pPr marL="0" indent="0">
+              <a:buNone/>
+            </a:pPr>
+            <a:endParaRPr lang="en-US" dirty="0" smtClean="0"/>
           </a:p>
           <a:p>
             <a:pPr marL="0" indent="0">
               <a:buNone/>
             </a:pPr>
             <a:r>
+              <a:rPr lang="en-US" dirty="0" smtClean="0"/>
+              <a:t>			</a:t>
+            </a:r>
+            <a:r>
               <a:rPr lang="en-US" dirty="0" smtClean="0">
                 <a:hlinkClick r:id="rId2" action="ppaction://hlinkfile"/>
               </a:rPr>
-              <a:t>file://localhost/Users/johannmarx/STORMReq/src/</a:t>
+              <a:t>Show Directory</a:t>
             </a:r>
             <a:endParaRPr lang="en-US" dirty="0" smtClean="0"/>
           </a:p>
         </p:txBody>
       </p:sp>
+      <p:cxnSp>
+        <p:nvCxnSpPr>
+          <p:cNvPr id="13" name="Curved Connector 12"/>
+          <p:cNvCxnSpPr/>
+          <p:nvPr/>
+        </p:nvCxnSpPr>
+        <p:spPr>
+          <a:xfrm>
+            <a:off x="2190750" y="3381375"/>
+            <a:ext cx="1206500" cy="1174750"/>
+          </a:xfrm>
+          <a:prstGeom prst="curvedConnector3">
+            <a:avLst>
+              <a:gd name="adj1" fmla="val 50000"/>
+            </a:avLst>
+          </a:prstGeom>
+          <a:ln>
+            <a:tailEnd type="arrow"/>
+          </a:ln>
+        </p:spPr>
+        <p:style>
+          <a:lnRef idx="2">
+            <a:schemeClr val="accent1"/>
+          </a:lnRef>
+          <a:fillRef idx="0">
+            <a:schemeClr val="accent1"/>
+          </a:fillRef>
+          <a:effectRef idx="1">
+            <a:schemeClr val="accent1"/>
+          </a:effectRef>
+          <a:fontRef idx="minor">
+            <a:schemeClr val="tx1"/>
+          </a:fontRef>
+        </p:style>
+      </p:cxnSp>
     </p:spTree>
     <p:extLst>
       <p:ext uri="{BB962C8B-B14F-4D97-AF65-F5344CB8AC3E}">

</xml_diff>